<commit_message>
program guncellendi pandas eklendi
</commit_message>
<xml_diff>
--- a/00_acilis_preprocessing-analysis-ml-dl-big-data.pptx
+++ b/00_acilis_preprocessing-analysis-ml-dl-big-data.pptx
@@ -10,8 +10,9 @@
     <p:sldId id="328" r:id="rId4"/>
     <p:sldId id="330" r:id="rId5"/>
     <p:sldId id="332" r:id="rId6"/>
-    <p:sldId id="333" r:id="rId7"/>
-    <p:sldId id="331" r:id="rId8"/>
+    <p:sldId id="334" r:id="rId7"/>
+    <p:sldId id="333" r:id="rId8"/>
+    <p:sldId id="331" r:id="rId9"/>
   </p:sldIdLst>
   <p:sldSz cx="12192000" cy="6858000"/>
   <p:notesSz cx="6858000" cy="9144000"/>
@@ -257,19 +258,19 @@
   </pc:docChgLst>
   <pc:docChgLst>
     <pc:chgData name="Erkan ŞİRİN" userId="7f10ce1d6aaf8c5d" providerId="LiveId" clId="{8A07AB2F-FA98-4AB7-A034-4EBBDB3F8537}"/>
-    <pc:docChg chg="custSel addSld delSld modSld">
-      <pc:chgData name="Erkan ŞİRİN" userId="7f10ce1d6aaf8c5d" providerId="LiveId" clId="{8A07AB2F-FA98-4AB7-A034-4EBBDB3F8537}" dt="2019-05-14T01:19:14.875" v="727" actId="20577"/>
+    <pc:docChg chg="undo custSel addSld delSld modSld">
+      <pc:chgData name="Erkan ŞİRİN" userId="7f10ce1d6aaf8c5d" providerId="LiveId" clId="{8A07AB2F-FA98-4AB7-A034-4EBBDB3F8537}" dt="2019-05-15T18:09:25.938" v="863" actId="1076"/>
       <pc:docMkLst>
         <pc:docMk/>
       </pc:docMkLst>
       <pc:sldChg chg="modSp">
-        <pc:chgData name="Erkan ŞİRİN" userId="7f10ce1d6aaf8c5d" providerId="LiveId" clId="{8A07AB2F-FA98-4AB7-A034-4EBBDB3F8537}" dt="2019-05-14T01:01:03.105" v="93" actId="1076"/>
+        <pc:chgData name="Erkan ŞİRİN" userId="7f10ce1d6aaf8c5d" providerId="LiveId" clId="{8A07AB2F-FA98-4AB7-A034-4EBBDB3F8537}" dt="2019-05-15T18:09:25.938" v="863" actId="1076"/>
         <pc:sldMkLst>
           <pc:docMk/>
           <pc:sldMk cId="2918214722" sldId="256"/>
         </pc:sldMkLst>
         <pc:spChg chg="mod">
-          <ac:chgData name="Erkan ŞİRİN" userId="7f10ce1d6aaf8c5d" providerId="LiveId" clId="{8A07AB2F-FA98-4AB7-A034-4EBBDB3F8537}" dt="2019-05-14T01:01:00.589" v="92" actId="1076"/>
+          <ac:chgData name="Erkan ŞİRİN" userId="7f10ce1d6aaf8c5d" providerId="LiveId" clId="{8A07AB2F-FA98-4AB7-A034-4EBBDB3F8537}" dt="2019-05-15T18:09:22.837" v="862" actId="1076"/>
           <ac:spMkLst>
             <pc:docMk/>
             <pc:sldMk cId="2918214722" sldId="256"/>
@@ -277,7 +278,7 @@
           </ac:spMkLst>
         </pc:spChg>
         <pc:spChg chg="mod">
-          <ac:chgData name="Erkan ŞİRİN" userId="7f10ce1d6aaf8c5d" providerId="LiveId" clId="{8A07AB2F-FA98-4AB7-A034-4EBBDB3F8537}" dt="2019-05-14T01:01:03.105" v="93" actId="1076"/>
+          <ac:chgData name="Erkan ŞİRİN" userId="7f10ce1d6aaf8c5d" providerId="LiveId" clId="{8A07AB2F-FA98-4AB7-A034-4EBBDB3F8537}" dt="2019-05-15T18:09:25.938" v="863" actId="1076"/>
           <ac:spMkLst>
             <pc:docMk/>
             <pc:sldMk cId="2918214722" sldId="256"/>
@@ -338,7 +339,7 @@
         </pc:sldMkLst>
       </pc:sldChg>
       <pc:sldChg chg="addSp delSp modSp add delAnim">
-        <pc:chgData name="Erkan ŞİRİN" userId="7f10ce1d6aaf8c5d" providerId="LiveId" clId="{8A07AB2F-FA98-4AB7-A034-4EBBDB3F8537}" dt="2019-05-14T01:07:28.964" v="389" actId="20577"/>
+        <pc:chgData name="Erkan ŞİRİN" userId="7f10ce1d6aaf8c5d" providerId="LiveId" clId="{8A07AB2F-FA98-4AB7-A034-4EBBDB3F8537}" dt="2019-05-15T18:05:55.258" v="754" actId="478"/>
         <pc:sldMkLst>
           <pc:docMk/>
           <pc:sldMk cId="2692841324" sldId="332"/>
@@ -352,24 +353,32 @@
           </ac:spMkLst>
         </pc:spChg>
         <pc:spChg chg="mod">
-          <ac:chgData name="Erkan ŞİRİN" userId="7f10ce1d6aaf8c5d" providerId="LiveId" clId="{8A07AB2F-FA98-4AB7-A034-4EBBDB3F8537}" dt="2019-05-14T01:07:28.964" v="389" actId="20577"/>
+          <ac:chgData name="Erkan ŞİRİN" userId="7f10ce1d6aaf8c5d" providerId="LiveId" clId="{8A07AB2F-FA98-4AB7-A034-4EBBDB3F8537}" dt="2019-05-15T16:40:24.954" v="737" actId="14100"/>
           <ac:spMkLst>
             <pc:docMk/>
             <pc:sldMk cId="2692841324" sldId="332"/>
             <ac:spMk id="16" creationId="{00000000-0000-0000-0000-000000000000}"/>
           </ac:spMkLst>
         </pc:spChg>
-        <pc:graphicFrameChg chg="add mod modGraphic">
-          <ac:chgData name="Erkan ŞİRİN" userId="7f10ce1d6aaf8c5d" providerId="LiveId" clId="{8A07AB2F-FA98-4AB7-A034-4EBBDB3F8537}" dt="2019-05-14T01:07:23.630" v="381" actId="12385"/>
+        <pc:graphicFrameChg chg="add del mod modGraphic">
+          <ac:chgData name="Erkan ŞİRİN" userId="7f10ce1d6aaf8c5d" providerId="LiveId" clId="{8A07AB2F-FA98-4AB7-A034-4EBBDB3F8537}" dt="2019-05-15T18:05:55.258" v="754" actId="478"/>
           <ac:graphicFrameMkLst>
             <pc:docMk/>
             <pc:sldMk cId="2692841324" sldId="332"/>
             <ac:graphicFrameMk id="2" creationId="{F7A6A035-4F9C-4E8A-9478-6E1DEF5AFA0B}"/>
           </ac:graphicFrameMkLst>
         </pc:graphicFrameChg>
+        <pc:graphicFrameChg chg="add del">
+          <ac:chgData name="Erkan ŞİRİN" userId="7f10ce1d6aaf8c5d" providerId="LiveId" clId="{8A07AB2F-FA98-4AB7-A034-4EBBDB3F8537}" dt="2019-05-15T18:05:54.758" v="753"/>
+          <ac:graphicFrameMkLst>
+            <pc:docMk/>
+            <pc:sldMk cId="2692841324" sldId="332"/>
+            <ac:graphicFrameMk id="3" creationId="{2489EE28-94EE-4569-AC27-A75D7B8149A7}"/>
+          </ac:graphicFrameMkLst>
+        </pc:graphicFrameChg>
       </pc:sldChg>
       <pc:sldChg chg="modSp add">
-        <pc:chgData name="Erkan ŞİRİN" userId="7f10ce1d6aaf8c5d" providerId="LiveId" clId="{8A07AB2F-FA98-4AB7-A034-4EBBDB3F8537}" dt="2019-05-14T01:19:14.875" v="727" actId="20577"/>
+        <pc:chgData name="Erkan ŞİRİN" userId="7f10ce1d6aaf8c5d" providerId="LiveId" clId="{8A07AB2F-FA98-4AB7-A034-4EBBDB3F8537}" dt="2019-05-15T18:08:47.217" v="861" actId="20577"/>
         <pc:sldMkLst>
           <pc:docMk/>
           <pc:sldMk cId="136345581" sldId="333"/>
@@ -383,11 +392,42 @@
           </ac:spMkLst>
         </pc:spChg>
         <pc:graphicFrameChg chg="mod modGraphic">
-          <ac:chgData name="Erkan ŞİRİN" userId="7f10ce1d6aaf8c5d" providerId="LiveId" clId="{8A07AB2F-FA98-4AB7-A034-4EBBDB3F8537}" dt="2019-05-14T01:18:32.048" v="715" actId="1076"/>
+          <ac:chgData name="Erkan ŞİRİN" userId="7f10ce1d6aaf8c5d" providerId="LiveId" clId="{8A07AB2F-FA98-4AB7-A034-4EBBDB3F8537}" dt="2019-05-15T18:08:47.217" v="861" actId="20577"/>
           <ac:graphicFrameMkLst>
             <pc:docMk/>
             <pc:sldMk cId="136345581" sldId="333"/>
             <ac:graphicFrameMk id="2" creationId="{F7A6A035-4F9C-4E8A-9478-6E1DEF5AFA0B}"/>
+          </ac:graphicFrameMkLst>
+        </pc:graphicFrameChg>
+      </pc:sldChg>
+      <pc:sldChg chg="addSp delSp modSp add">
+        <pc:chgData name="Erkan ŞİRİN" userId="7f10ce1d6aaf8c5d" providerId="LiveId" clId="{8A07AB2F-FA98-4AB7-A034-4EBBDB3F8537}" dt="2019-05-15T18:08:11.567" v="843" actId="6549"/>
+        <pc:sldMkLst>
+          <pc:docMk/>
+          <pc:sldMk cId="2360627406" sldId="334"/>
+        </pc:sldMkLst>
+        <pc:spChg chg="mod">
+          <ac:chgData name="Erkan ŞİRİN" userId="7f10ce1d6aaf8c5d" providerId="LiveId" clId="{8A07AB2F-FA98-4AB7-A034-4EBBDB3F8537}" dt="2019-05-15T16:40:41.894" v="747" actId="1076"/>
+          <ac:spMkLst>
+            <pc:docMk/>
+            <pc:sldMk cId="2360627406" sldId="334"/>
+            <ac:spMk id="16" creationId="{00000000-0000-0000-0000-000000000000}"/>
+          </ac:spMkLst>
+        </pc:spChg>
+        <pc:graphicFrameChg chg="add del mod modGraphic">
+          <ac:chgData name="Erkan ŞİRİN" userId="7f10ce1d6aaf8c5d" providerId="LiveId" clId="{8A07AB2F-FA98-4AB7-A034-4EBBDB3F8537}" dt="2019-05-15T18:08:11.567" v="843" actId="6549"/>
+          <ac:graphicFrameMkLst>
+            <pc:docMk/>
+            <pc:sldMk cId="2360627406" sldId="334"/>
+            <ac:graphicFrameMk id="2" creationId="{F7A6A035-4F9C-4E8A-9478-6E1DEF5AFA0B}"/>
+          </ac:graphicFrameMkLst>
+        </pc:graphicFrameChg>
+        <pc:graphicFrameChg chg="add del">
+          <ac:chgData name="Erkan ŞİRİN" userId="7f10ce1d6aaf8c5d" providerId="LiveId" clId="{8A07AB2F-FA98-4AB7-A034-4EBBDB3F8537}" dt="2019-05-15T18:05:57.608" v="755"/>
+          <ac:graphicFrameMkLst>
+            <pc:docMk/>
+            <pc:sldMk cId="2360627406" sldId="334"/>
+            <ac:graphicFrameMk id="3" creationId="{FC6BDE8A-3DBD-4BE8-BD5E-4E08556F1266}"/>
           </ac:graphicFrameMkLst>
         </pc:graphicFrameChg>
       </pc:sldChg>
@@ -543,7 +583,7 @@
           <a:p>
             <a:fld id="{BAB971F1-0A24-473E-8A66-D77E329B588E}" type="datetimeFigureOut">
               <a:rPr lang="tr-TR" smtClean="0"/>
-              <a:t>14.05.2019</a:t>
+              <a:t>15.05.2019</a:t>
             </a:fld>
             <a:endParaRPr lang="tr-TR"/>
           </a:p>
@@ -741,7 +781,7 @@
           <a:p>
             <a:fld id="{BAB971F1-0A24-473E-8A66-D77E329B588E}" type="datetimeFigureOut">
               <a:rPr lang="tr-TR" smtClean="0"/>
-              <a:t>14.05.2019</a:t>
+              <a:t>15.05.2019</a:t>
             </a:fld>
             <a:endParaRPr lang="tr-TR"/>
           </a:p>
@@ -949,7 +989,7 @@
           <a:p>
             <a:fld id="{BAB971F1-0A24-473E-8A66-D77E329B588E}" type="datetimeFigureOut">
               <a:rPr lang="tr-TR" smtClean="0"/>
-              <a:t>14.05.2019</a:t>
+              <a:t>15.05.2019</a:t>
             </a:fld>
             <a:endParaRPr lang="tr-TR"/>
           </a:p>
@@ -1147,7 +1187,7 @@
           <a:p>
             <a:fld id="{BAB971F1-0A24-473E-8A66-D77E329B588E}" type="datetimeFigureOut">
               <a:rPr lang="tr-TR" smtClean="0"/>
-              <a:t>14.05.2019</a:t>
+              <a:t>15.05.2019</a:t>
             </a:fld>
             <a:endParaRPr lang="tr-TR"/>
           </a:p>
@@ -1422,7 +1462,7 @@
           <a:p>
             <a:fld id="{BAB971F1-0A24-473E-8A66-D77E329B588E}" type="datetimeFigureOut">
               <a:rPr lang="tr-TR" smtClean="0"/>
-              <a:t>14.05.2019</a:t>
+              <a:t>15.05.2019</a:t>
             </a:fld>
             <a:endParaRPr lang="tr-TR"/>
           </a:p>
@@ -1687,7 +1727,7 @@
           <a:p>
             <a:fld id="{BAB971F1-0A24-473E-8A66-D77E329B588E}" type="datetimeFigureOut">
               <a:rPr lang="tr-TR" smtClean="0"/>
-              <a:t>14.05.2019</a:t>
+              <a:t>15.05.2019</a:t>
             </a:fld>
             <a:endParaRPr lang="tr-TR"/>
           </a:p>
@@ -2099,7 +2139,7 @@
           <a:p>
             <a:fld id="{BAB971F1-0A24-473E-8A66-D77E329B588E}" type="datetimeFigureOut">
               <a:rPr lang="tr-TR" smtClean="0"/>
-              <a:t>14.05.2019</a:t>
+              <a:t>15.05.2019</a:t>
             </a:fld>
             <a:endParaRPr lang="tr-TR"/>
           </a:p>
@@ -2240,7 +2280,7 @@
           <a:p>
             <a:fld id="{BAB971F1-0A24-473E-8A66-D77E329B588E}" type="datetimeFigureOut">
               <a:rPr lang="tr-TR" smtClean="0"/>
-              <a:t>14.05.2019</a:t>
+              <a:t>15.05.2019</a:t>
             </a:fld>
             <a:endParaRPr lang="tr-TR"/>
           </a:p>
@@ -2353,7 +2393,7 @@
           <a:p>
             <a:fld id="{BAB971F1-0A24-473E-8A66-D77E329B588E}" type="datetimeFigureOut">
               <a:rPr lang="tr-TR" smtClean="0"/>
-              <a:t>14.05.2019</a:t>
+              <a:t>15.05.2019</a:t>
             </a:fld>
             <a:endParaRPr lang="tr-TR"/>
           </a:p>
@@ -2664,7 +2704,7 @@
           <a:p>
             <a:fld id="{BAB971F1-0A24-473E-8A66-D77E329B588E}" type="datetimeFigureOut">
               <a:rPr lang="tr-TR" smtClean="0"/>
-              <a:t>14.05.2019</a:t>
+              <a:t>15.05.2019</a:t>
             </a:fld>
             <a:endParaRPr lang="tr-TR"/>
           </a:p>
@@ -2952,7 +2992,7 @@
           <a:p>
             <a:fld id="{BAB971F1-0A24-473E-8A66-D77E329B588E}" type="datetimeFigureOut">
               <a:rPr lang="tr-TR" smtClean="0"/>
-              <a:t>14.05.2019</a:t>
+              <a:t>15.05.2019</a:t>
             </a:fld>
             <a:endParaRPr lang="tr-TR"/>
           </a:p>
@@ -3193,7 +3233,7 @@
           <a:p>
             <a:fld id="{BAB971F1-0A24-473E-8A66-D77E329B588E}" type="datetimeFigureOut">
               <a:rPr lang="tr-TR" smtClean="0"/>
-              <a:t>14.05.2019</a:t>
+              <a:t>15.05.2019</a:t>
             </a:fld>
             <a:endParaRPr lang="tr-TR"/>
           </a:p>
@@ -3628,7 +3668,7 @@
         </p:nvSpPr>
         <p:spPr>
           <a:xfrm>
-            <a:off x="2742450" y="1015999"/>
+            <a:off x="2742449" y="634999"/>
             <a:ext cx="7247415" cy="3111501"/>
           </a:xfrm>
         </p:spPr>
@@ -3846,7 +3886,7 @@
         </p:nvSpPr>
         <p:spPr>
           <a:xfrm>
-            <a:off x="2206204" y="4518562"/>
+            <a:off x="2206203" y="4048662"/>
             <a:ext cx="8319906" cy="1323439"/>
           </a:xfrm>
           <a:prstGeom prst="rect">
@@ -4275,7 +4315,7 @@
               <a:rPr lang="tr-TR" sz="3200" dirty="0">
                 <a:latin typeface="Roboto"/>
               </a:rPr>
-              <a:t>Öğleden Önce	: 09:00 – 13:00</a:t>
+              <a:t>Öğleden Önce	: 09:00 – 12:30</a:t>
             </a:r>
           </a:p>
           <a:p>
@@ -4289,7 +4329,7 @@
               <a:rPr lang="tr-TR" sz="3200" dirty="0">
                 <a:latin typeface="Roboto"/>
               </a:rPr>
-              <a:t>Öğle Arası		: 13:00 - 14:00</a:t>
+              <a:t>Öğle Arası		: 12:30 - 14:00</a:t>
             </a:r>
           </a:p>
           <a:p>
@@ -4657,6 +4697,14 @@
               </a:rPr>
               <a:t>https://github.com/erkansirin78/preprocessing-analysis-ml-dl-big-data</a:t>
             </a:r>
+            <a:endParaRPr lang="tr-TR" sz="2400" dirty="0"/>
+          </a:p>
+          <a:p>
+            <a:pPr>
+              <a:lnSpc>
+                <a:spcPct val="150000"/>
+              </a:lnSpc>
+            </a:pPr>
             <a:r>
               <a:rPr lang="tr-TR" sz="2400" dirty="0">
                 <a:latin typeface="Roboto"/>
@@ -4992,6 +5040,67 @@
                       </p:childTnLst>
                     </p:cTn>
                   </p:par>
+                  <p:par>
+                    <p:cTn id="23" fill="hold">
+                      <p:stCondLst>
+                        <p:cond delay="indefinite"/>
+                      </p:stCondLst>
+                      <p:childTnLst>
+                        <p:par>
+                          <p:cTn id="24" fill="hold">
+                            <p:stCondLst>
+                              <p:cond delay="0"/>
+                            </p:stCondLst>
+                            <p:childTnLst>
+                              <p:par>
+                                <p:cTn id="25" presetID="10" presetClass="entr" presetSubtype="0" fill="hold" nodeType="clickEffect">
+                                  <p:stCondLst>
+                                    <p:cond delay="0"/>
+                                  </p:stCondLst>
+                                  <p:childTnLst>
+                                    <p:set>
+                                      <p:cBhvr>
+                                        <p:cTn id="26" dur="1" fill="hold">
+                                          <p:stCondLst>
+                                            <p:cond delay="0"/>
+                                          </p:stCondLst>
+                                        </p:cTn>
+                                        <p:tgtEl>
+                                          <p:spTgt spid="3">
+                                            <p:txEl>
+                                              <p:pRg st="4" end="4"/>
+                                            </p:txEl>
+                                          </p:spTgt>
+                                        </p:tgtEl>
+                                        <p:attrNameLst>
+                                          <p:attrName>style.visibility</p:attrName>
+                                        </p:attrNameLst>
+                                      </p:cBhvr>
+                                      <p:to>
+                                        <p:strVal val="visible"/>
+                                      </p:to>
+                                    </p:set>
+                                    <p:animEffect transition="in" filter="fade">
+                                      <p:cBhvr>
+                                        <p:cTn id="27" dur="500"/>
+                                        <p:tgtEl>
+                                          <p:spTgt spid="3">
+                                            <p:txEl>
+                                              <p:pRg st="4" end="4"/>
+                                            </p:txEl>
+                                          </p:spTgt>
+                                        </p:tgtEl>
+                                      </p:cBhvr>
+                                    </p:animEffect>
+                                  </p:childTnLst>
+                                </p:cTn>
+                              </p:par>
+                            </p:childTnLst>
+                          </p:cTn>
+                        </p:par>
+                      </p:childTnLst>
+                    </p:cTn>
+                  </p:par>
                 </p:childTnLst>
               </p:cTn>
               <p:prevCondLst>
@@ -5046,8 +5155,8 @@
         </p:nvSpPr>
         <p:spPr>
           <a:xfrm>
-            <a:off x="3574026" y="304799"/>
-            <a:ext cx="5043948" cy="619433"/>
+            <a:off x="2648309" y="304799"/>
+            <a:ext cx="6970144" cy="619433"/>
           </a:xfrm>
         </p:spPr>
         <p:txBody>
@@ -5065,7 +5174,7 @@
                 <a:ea typeface="+mn-ea"/>
                 <a:cs typeface="+mn-cs"/>
               </a:rPr>
-              <a:t>Eğitim Programı</a:t>
+              <a:t>Eğitim Programı (Eski)</a:t>
             </a:r>
             <a:endParaRPr lang="en-US" sz="4000" b="1" dirty="0">
               <a:solidFill>
@@ -5153,12 +5262,12 @@
                         </a:spcAft>
                       </a:pPr>
                       <a:r>
-                        <a:rPr lang="tr-TR" sz="2000">
+                        <a:rPr lang="tr-TR" sz="2000" dirty="0">
                           <a:effectLst/>
                         </a:rPr>
                         <a:t>S.NU.</a:t>
                       </a:r>
-                      <a:endParaRPr lang="tr-TR" sz="2000">
+                      <a:endParaRPr lang="tr-TR" sz="2000" dirty="0">
                         <a:effectLst/>
                         <a:latin typeface="Calibri" panose="020F0502020204030204" pitchFamily="34" charset="0"/>
                         <a:ea typeface="Calibri" panose="020F0502020204030204" pitchFamily="34" charset="0"/>
@@ -5305,12 +5414,24 @@
                         </a:spcAft>
                       </a:pPr>
                       <a:r>
-                        <a:rPr lang="tr-TR" sz="2000">
-                          <a:effectLst/>
-                        </a:rPr>
-                        <a:t>Data Preprocessing (Veri Ön İşleme)</a:t>
-                      </a:r>
-                      <a:endParaRPr lang="tr-TR" sz="2000">
+                        <a:rPr lang="tr-TR" sz="2000" dirty="0">
+                          <a:effectLst/>
+                        </a:rPr>
+                        <a:t>Data </a:t>
+                      </a:r>
+                      <a:r>
+                        <a:rPr lang="tr-TR" sz="2000" dirty="0" err="1">
+                          <a:effectLst/>
+                        </a:rPr>
+                        <a:t>Preprocessing</a:t>
+                      </a:r>
+                      <a:r>
+                        <a:rPr lang="tr-TR" sz="2000" dirty="0">
+                          <a:effectLst/>
+                        </a:rPr>
+                        <a:t> (Veri Ön İşleme)</a:t>
+                      </a:r>
+                      <a:endParaRPr lang="tr-TR" sz="2000" dirty="0">
                         <a:effectLst/>
                         <a:latin typeface="Calibri" panose="020F0502020204030204" pitchFamily="34" charset="0"/>
                         <a:ea typeface="Calibri" panose="020F0502020204030204" pitchFamily="34" charset="0"/>
@@ -5428,12 +5549,24 @@
                         </a:spcAft>
                       </a:pPr>
                       <a:r>
-                        <a:rPr lang="tr-TR" sz="2000">
-                          <a:effectLst/>
-                        </a:rPr>
-                        <a:t>Data Cleaning (Veri Temizleme)</a:t>
-                      </a:r>
-                      <a:endParaRPr lang="tr-TR" sz="2000">
+                        <a:rPr lang="tr-TR" sz="2000" dirty="0">
+                          <a:effectLst/>
+                        </a:rPr>
+                        <a:t>Data </a:t>
+                      </a:r>
+                      <a:r>
+                        <a:rPr lang="tr-TR" sz="2000" dirty="0" err="1">
+                          <a:effectLst/>
+                        </a:rPr>
+                        <a:t>Cleaning</a:t>
+                      </a:r>
+                      <a:r>
+                        <a:rPr lang="tr-TR" sz="2000" dirty="0">
+                          <a:effectLst/>
+                        </a:rPr>
+                        <a:t> (Veri Temizleme)</a:t>
+                      </a:r>
+                      <a:endParaRPr lang="tr-TR" sz="2000" dirty="0">
                         <a:effectLst/>
                         <a:latin typeface="Calibri" panose="020F0502020204030204" pitchFamily="34" charset="0"/>
                         <a:ea typeface="Calibri" panose="020F0502020204030204" pitchFamily="34" charset="0"/>
@@ -5551,12 +5684,60 @@
                         </a:spcAft>
                       </a:pPr>
                       <a:r>
-                        <a:rPr lang="tr-TR" sz="2000">
-                          <a:effectLst/>
-                        </a:rPr>
-                        <a:t>ETL (Extract, Transform and Load)</a:t>
-                      </a:r>
-                      <a:endParaRPr lang="tr-TR" sz="2000">
+                        <a:rPr lang="tr-TR" sz="2000" dirty="0">
+                          <a:effectLst/>
+                        </a:rPr>
+                        <a:t>ETL (</a:t>
+                      </a:r>
+                      <a:r>
+                        <a:rPr lang="tr-TR" sz="2000" dirty="0" err="1">
+                          <a:effectLst/>
+                        </a:rPr>
+                        <a:t>Extract</a:t>
+                      </a:r>
+                      <a:r>
+                        <a:rPr lang="tr-TR" sz="2000" dirty="0">
+                          <a:effectLst/>
+                        </a:rPr>
+                        <a:t>, </a:t>
+                      </a:r>
+                      <a:r>
+                        <a:rPr lang="tr-TR" sz="2000" dirty="0" err="1">
+                          <a:effectLst/>
+                        </a:rPr>
+                        <a:t>Transform</a:t>
+                      </a:r>
+                      <a:r>
+                        <a:rPr lang="tr-TR" sz="2000" dirty="0">
+                          <a:effectLst/>
+                        </a:rPr>
+                        <a:t> </a:t>
+                      </a:r>
+                      <a:r>
+                        <a:rPr lang="tr-TR" sz="2000" dirty="0" err="1">
+                          <a:effectLst/>
+                        </a:rPr>
+                        <a:t>and</a:t>
+                      </a:r>
+                      <a:r>
+                        <a:rPr lang="tr-TR" sz="2000" dirty="0">
+                          <a:effectLst/>
+                        </a:rPr>
+                        <a:t> </a:t>
+                      </a:r>
+                      <a:r>
+                        <a:rPr lang="tr-TR" sz="2000" dirty="0" err="1">
+                          <a:effectLst/>
+                        </a:rPr>
+                        <a:t>Load</a:t>
+                      </a:r>
+                      <a:r>
+                        <a:rPr lang="tr-TR" sz="2000" dirty="0">
+                          <a:effectLst/>
+                        </a:rPr>
+                        <a:t>)</a:t>
+                      </a:r>
+                      <a:endParaRPr lang="tr-TR" sz="2000" dirty="0">
                         <a:effectLst/>
                         <a:latin typeface="Calibri" panose="020F0502020204030204" pitchFamily="34" charset="0"/>
                         <a:ea typeface="Calibri" panose="020F0502020204030204" pitchFamily="34" charset="0"/>
@@ -5674,12 +5855,12 @@
                         </a:spcAft>
                       </a:pPr>
                       <a:r>
-                        <a:rPr lang="tr-TR" sz="2000">
+                        <a:rPr lang="tr-TR" sz="2000" dirty="0">
                           <a:effectLst/>
                         </a:rPr>
                         <a:t>Data Analysis (Veri Analizi)</a:t>
                       </a:r>
-                      <a:endParaRPr lang="tr-TR" sz="2000">
+                      <a:endParaRPr lang="tr-TR" sz="2000" dirty="0">
                         <a:effectLst/>
                         <a:latin typeface="Calibri" panose="020F0502020204030204" pitchFamily="34" charset="0"/>
                         <a:ea typeface="Calibri" panose="020F0502020204030204" pitchFamily="34" charset="0"/>
@@ -5797,12 +5978,12 @@
                         </a:spcAft>
                       </a:pPr>
                       <a:r>
-                        <a:rPr lang="tr-TR" sz="2000">
+                        <a:rPr lang="tr-TR" sz="2000" dirty="0">
                           <a:effectLst/>
                         </a:rPr>
                         <a:t>Machine Learning (Makine Öğrenmesi)</a:t>
                       </a:r>
-                      <a:endParaRPr lang="tr-TR" sz="2000">
+                      <a:endParaRPr lang="tr-TR" sz="2000" dirty="0">
                         <a:effectLst/>
                         <a:latin typeface="Calibri" panose="020F0502020204030204" pitchFamily="34" charset="0"/>
                         <a:ea typeface="Calibri" panose="020F0502020204030204" pitchFamily="34" charset="0"/>
@@ -5920,12 +6101,18 @@
                         </a:spcAft>
                       </a:pPr>
                       <a:r>
-                        <a:rPr lang="tr-TR" sz="2000">
-                          <a:effectLst/>
-                        </a:rPr>
-                        <a:t>Deep Learning (Derin Öğrenme)</a:t>
-                      </a:r>
-                      <a:endParaRPr lang="tr-TR" sz="2000">
+                        <a:rPr lang="tr-TR" sz="2000" dirty="0" err="1">
+                          <a:effectLst/>
+                        </a:rPr>
+                        <a:t>Deep</a:t>
+                      </a:r>
+                      <a:r>
+                        <a:rPr lang="tr-TR" sz="2000" dirty="0">
+                          <a:effectLst/>
+                        </a:rPr>
+                        <a:t> Learning (Derin Öğrenme)</a:t>
+                      </a:r>
+                      <a:endParaRPr lang="tr-TR" sz="2000" dirty="0">
                         <a:effectLst/>
                         <a:latin typeface="Calibri" panose="020F0502020204030204" pitchFamily="34" charset="0"/>
                         <a:ea typeface="Calibri" panose="020F0502020204030204" pitchFamily="34" charset="0"/>
@@ -6043,12 +6230,18 @@
                         </a:spcAft>
                       </a:pPr>
                       <a:r>
-                        <a:rPr lang="tr-TR" sz="2000">
-                          <a:effectLst/>
-                        </a:rPr>
-                        <a:t>Big Data (Büyük Veri)</a:t>
-                      </a:r>
-                      <a:endParaRPr lang="tr-TR" sz="2000">
+                        <a:rPr lang="tr-TR" sz="2000" dirty="0" err="1">
+                          <a:effectLst/>
+                        </a:rPr>
+                        <a:t>Big</a:t>
+                      </a:r>
+                      <a:r>
+                        <a:rPr lang="tr-TR" sz="2000" dirty="0">
+                          <a:effectLst/>
+                        </a:rPr>
+                        <a:t> Data (Büyük Veri)</a:t>
+                      </a:r>
+                      <a:endParaRPr lang="tr-TR" sz="2000" dirty="0">
                         <a:effectLst/>
                         <a:latin typeface="Calibri" panose="020F0502020204030204" pitchFamily="34" charset="0"/>
                         <a:ea typeface="Calibri" panose="020F0502020204030204" pitchFamily="34" charset="0"/>
@@ -6072,12 +6265,12 @@
                         </a:spcAft>
                       </a:pPr>
                       <a:r>
-                        <a:rPr lang="tr-TR" sz="2000">
+                        <a:rPr lang="tr-TR" sz="2000" dirty="0">
                           <a:effectLst/>
                         </a:rPr>
                         <a:t>3 GÜN</a:t>
                       </a:r>
-                      <a:endParaRPr lang="tr-TR" sz="2000">
+                      <a:endParaRPr lang="tr-TR" sz="2000" dirty="0">
                         <a:effectLst/>
                         <a:latin typeface="Calibri" panose="020F0502020204030204" pitchFamily="34" charset="0"/>
                         <a:ea typeface="Calibri" panose="020F0502020204030204" pitchFamily="34" charset="0"/>
@@ -6101,7 +6294,7 @@
                         </a:spcAft>
                       </a:pPr>
                       <a:r>
-                        <a:rPr lang="tr-TR" sz="2000">
+                        <a:rPr lang="tr-TR" sz="2000" dirty="0">
                           <a:effectLst/>
                         </a:rPr>
                         <a:t>09-10 Temmuz 2019</a:t>
@@ -6117,12 +6310,12 @@
                         </a:spcAft>
                       </a:pPr>
                       <a:r>
-                        <a:rPr lang="tr-TR" sz="2000">
+                        <a:rPr lang="tr-TR" sz="2000" dirty="0">
                           <a:effectLst/>
                         </a:rPr>
                         <a:t>16-17 Temmuz 2019</a:t>
                       </a:r>
-                      <a:endParaRPr lang="tr-TR" sz="2000">
+                      <a:endParaRPr lang="tr-TR" sz="2000" dirty="0">
                         <a:effectLst/>
                         <a:latin typeface="Calibri" panose="020F0502020204030204" pitchFamily="34" charset="0"/>
                         <a:ea typeface="Calibri" panose="020F0502020204030204" pitchFamily="34" charset="0"/>
@@ -6310,8 +6503,8 @@
         </p:nvSpPr>
         <p:spPr>
           <a:xfrm>
-            <a:off x="1535501" y="304799"/>
-            <a:ext cx="9188569" cy="980537"/>
+            <a:off x="3007743" y="278920"/>
+            <a:ext cx="6176514" cy="619433"/>
           </a:xfrm>
         </p:spPr>
         <p:txBody>
@@ -6321,7 +6514,7 @@
           <a:lstStyle/>
           <a:p>
             <a:r>
-              <a:rPr lang="tr-TR" sz="3200" b="1" dirty="0">
+              <a:rPr lang="tr-TR" sz="4000" b="1" dirty="0">
                 <a:solidFill>
                   <a:srgbClr val="FF4D4D"/>
                 </a:solidFill>
@@ -6329,9 +6522,9 @@
                 <a:ea typeface="+mn-ea"/>
                 <a:cs typeface="+mn-cs"/>
               </a:rPr>
-              <a:t>Eğitimde Kullanılacak İşletim Sistemi, Donanım ve Yazılımlar</a:t>
-            </a:r>
-            <a:endParaRPr lang="en-US" sz="3200" b="1" dirty="0">
+              <a:t>Eğitim Programı (Yeni)</a:t>
+            </a:r>
+            <a:endParaRPr lang="en-US" sz="4000" b="1" dirty="0">
               <a:solidFill>
                 <a:srgbClr val="FF4D4D"/>
               </a:solidFill>
@@ -6357,7 +6550,1441 @@
           <p:nvPr>
             <p:extLst>
               <p:ext uri="{D42A27DB-BD31-4B8C-83A1-F6EECF244321}">
-                <p14:modId xmlns:p14="http://schemas.microsoft.com/office/powerpoint/2010/main" val="196513677"/>
+                <p14:modId xmlns:p14="http://schemas.microsoft.com/office/powerpoint/2010/main" val="2674364937"/>
+              </p:ext>
+            </p:extLst>
+          </p:nvPr>
+        </p:nvGraphicFramePr>
+        <p:xfrm>
+          <a:off x="1376632" y="1337814"/>
+          <a:ext cx="9790982" cy="4573487"/>
+        </p:xfrm>
+        <a:graphic>
+          <a:graphicData uri="http://schemas.openxmlformats.org/drawingml/2006/table">
+            <a:tbl>
+              <a:tblPr firstRow="1" firstCol="1" bandRow="1">
+                <a:tableStyleId>{E8B1032C-EA38-4F05-BA0D-38AFFFC7BED3}</a:tableStyleId>
+              </a:tblPr>
+              <a:tblGrid>
+                <a:gridCol w="867596">
+                  <a:extLst>
+                    <a:ext uri="{9D8B030D-6E8A-4147-A177-3AD203B41FA5}">
+                      <a16:colId xmlns:a16="http://schemas.microsoft.com/office/drawing/2014/main" val="580520300"/>
+                    </a:ext>
+                  </a:extLst>
+                </a:gridCol>
+                <a:gridCol w="4793929">
+                  <a:extLst>
+                    <a:ext uri="{9D8B030D-6E8A-4147-A177-3AD203B41FA5}">
+                      <a16:colId xmlns:a16="http://schemas.microsoft.com/office/drawing/2014/main" val="1517886636"/>
+                    </a:ext>
+                  </a:extLst>
+                </a:gridCol>
+                <a:gridCol w="1377566">
+                  <a:extLst>
+                    <a:ext uri="{9D8B030D-6E8A-4147-A177-3AD203B41FA5}">
+                      <a16:colId xmlns:a16="http://schemas.microsoft.com/office/drawing/2014/main" val="1040936458"/>
+                    </a:ext>
+                  </a:extLst>
+                </a:gridCol>
+                <a:gridCol w="2751891">
+                  <a:extLst>
+                    <a:ext uri="{9D8B030D-6E8A-4147-A177-3AD203B41FA5}">
+                      <a16:colId xmlns:a16="http://schemas.microsoft.com/office/drawing/2014/main" val="1577687456"/>
+                    </a:ext>
+                  </a:extLst>
+                </a:gridCol>
+              </a:tblGrid>
+              <a:tr h="534264">
+                <a:tc>
+                  <a:txBody>
+                    <a:bodyPr/>
+                    <a:lstStyle/>
+                    <a:p>
+                      <a:pPr algn="ctr">
+                        <a:lnSpc>
+                          <a:spcPct val="107000"/>
+                        </a:lnSpc>
+                        <a:spcAft>
+                          <a:spcPts val="0"/>
+                        </a:spcAft>
+                      </a:pPr>
+                      <a:r>
+                        <a:rPr lang="tr-TR" sz="2000">
+                          <a:effectLst/>
+                        </a:rPr>
+                        <a:t>S.NU.</a:t>
+                      </a:r>
+                      <a:endParaRPr lang="tr-TR" sz="2000">
+                        <a:effectLst/>
+                        <a:latin typeface="Calibri" panose="020F0502020204030204" pitchFamily="34" charset="0"/>
+                        <a:ea typeface="Calibri" panose="020F0502020204030204" pitchFamily="34" charset="0"/>
+                        <a:cs typeface="Times New Roman" panose="02020603050405020304" pitchFamily="18" charset="0"/>
+                      </a:endParaRPr>
+                    </a:p>
+                  </a:txBody>
+                  <a:tcPr marL="68580" marR="68580" marT="0" marB="0" anchor="ctr"/>
+                </a:tc>
+                <a:tc>
+                  <a:txBody>
+                    <a:bodyPr/>
+                    <a:lstStyle/>
+                    <a:p>
+                      <a:pPr algn="ctr">
+                        <a:lnSpc>
+                          <a:spcPct val="107000"/>
+                        </a:lnSpc>
+                        <a:spcAft>
+                          <a:spcPts val="0"/>
+                        </a:spcAft>
+                      </a:pPr>
+                      <a:r>
+                        <a:rPr lang="tr-TR" sz="2000">
+                          <a:effectLst/>
+                        </a:rPr>
+                        <a:t>EĞİTİMİN ADI</a:t>
+                      </a:r>
+                      <a:endParaRPr lang="tr-TR" sz="2000">
+                        <a:effectLst/>
+                        <a:latin typeface="Calibri" panose="020F0502020204030204" pitchFamily="34" charset="0"/>
+                        <a:ea typeface="Calibri" panose="020F0502020204030204" pitchFamily="34" charset="0"/>
+                        <a:cs typeface="Times New Roman" panose="02020603050405020304" pitchFamily="18" charset="0"/>
+                      </a:endParaRPr>
+                    </a:p>
+                  </a:txBody>
+                  <a:tcPr marL="68580" marR="68580" marT="0" marB="0" anchor="ctr"/>
+                </a:tc>
+                <a:tc>
+                  <a:txBody>
+                    <a:bodyPr/>
+                    <a:lstStyle/>
+                    <a:p>
+                      <a:pPr algn="ctr">
+                        <a:lnSpc>
+                          <a:spcPct val="107000"/>
+                        </a:lnSpc>
+                        <a:spcAft>
+                          <a:spcPts val="0"/>
+                        </a:spcAft>
+                      </a:pPr>
+                      <a:r>
+                        <a:rPr lang="tr-TR" sz="2000">
+                          <a:effectLst/>
+                        </a:rPr>
+                        <a:t>SÜRESİ</a:t>
+                      </a:r>
+                      <a:endParaRPr lang="tr-TR" sz="2000">
+                        <a:effectLst/>
+                        <a:latin typeface="Calibri" panose="020F0502020204030204" pitchFamily="34" charset="0"/>
+                        <a:ea typeface="Calibri" panose="020F0502020204030204" pitchFamily="34" charset="0"/>
+                        <a:cs typeface="Times New Roman" panose="02020603050405020304" pitchFamily="18" charset="0"/>
+                      </a:endParaRPr>
+                    </a:p>
+                  </a:txBody>
+                  <a:tcPr marL="68580" marR="68580" marT="0" marB="0" anchor="ctr"/>
+                </a:tc>
+                <a:tc>
+                  <a:txBody>
+                    <a:bodyPr/>
+                    <a:lstStyle/>
+                    <a:p>
+                      <a:pPr algn="ctr">
+                        <a:lnSpc>
+                          <a:spcPct val="107000"/>
+                        </a:lnSpc>
+                        <a:spcAft>
+                          <a:spcPts val="0"/>
+                        </a:spcAft>
+                      </a:pPr>
+                      <a:r>
+                        <a:rPr lang="tr-TR" sz="2000">
+                          <a:effectLst/>
+                        </a:rPr>
+                        <a:t>TARİHİ</a:t>
+                      </a:r>
+                      <a:endParaRPr lang="tr-TR" sz="2000">
+                        <a:effectLst/>
+                        <a:latin typeface="Calibri" panose="020F0502020204030204" pitchFamily="34" charset="0"/>
+                        <a:ea typeface="Calibri" panose="020F0502020204030204" pitchFamily="34" charset="0"/>
+                        <a:cs typeface="Times New Roman" panose="02020603050405020304" pitchFamily="18" charset="0"/>
+                      </a:endParaRPr>
+                    </a:p>
+                  </a:txBody>
+                  <a:tcPr marL="68580" marR="68580" marT="0" marB="0" anchor="ctr"/>
+                </a:tc>
+                <a:extLst>
+                  <a:ext uri="{0D108BD9-81ED-4DB2-BD59-A6C34878D82A}">
+                    <a16:rowId xmlns:a16="http://schemas.microsoft.com/office/drawing/2014/main" val="1446016634"/>
+                  </a:ext>
+                </a:extLst>
+              </a:tr>
+              <a:tr h="345926">
+                <a:tc>
+                  <a:txBody>
+                    <a:bodyPr/>
+                    <a:lstStyle/>
+                    <a:p>
+                      <a:pPr algn="ctr">
+                        <a:lnSpc>
+                          <a:spcPct val="107000"/>
+                        </a:lnSpc>
+                        <a:spcAft>
+                          <a:spcPts val="0"/>
+                        </a:spcAft>
+                      </a:pPr>
+                      <a:r>
+                        <a:rPr lang="tr-TR" sz="2000" dirty="0">
+                          <a:effectLst/>
+                        </a:rPr>
+                        <a:t>1.</a:t>
+                      </a:r>
+                      <a:endParaRPr lang="tr-TR" sz="2000" dirty="0">
+                        <a:effectLst/>
+                        <a:latin typeface="Calibri" panose="020F0502020204030204" pitchFamily="34" charset="0"/>
+                        <a:ea typeface="Calibri" panose="020F0502020204030204" pitchFamily="34" charset="0"/>
+                        <a:cs typeface="Times New Roman" panose="02020603050405020304" pitchFamily="18" charset="0"/>
+                      </a:endParaRPr>
+                    </a:p>
+                  </a:txBody>
+                  <a:tcPr marL="68580" marR="68580" marT="0" marB="0" anchor="ctr"/>
+                </a:tc>
+                <a:tc>
+                  <a:txBody>
+                    <a:bodyPr/>
+                    <a:lstStyle/>
+                    <a:p>
+                      <a:pPr>
+                        <a:lnSpc>
+                          <a:spcPct val="107000"/>
+                        </a:lnSpc>
+                        <a:spcAft>
+                          <a:spcPts val="0"/>
+                        </a:spcAft>
+                      </a:pPr>
+                      <a:r>
+                        <a:rPr lang="tr-TR" sz="2000" dirty="0">
+                          <a:effectLst/>
+                        </a:rPr>
+                        <a:t>Python Temel</a:t>
+                      </a:r>
+                      <a:endParaRPr lang="tr-TR" sz="2000" dirty="0">
+                        <a:effectLst/>
+                        <a:latin typeface="Calibri" panose="020F0502020204030204" pitchFamily="34" charset="0"/>
+                        <a:ea typeface="Calibri" panose="020F0502020204030204" pitchFamily="34" charset="0"/>
+                        <a:cs typeface="Times New Roman" panose="02020603050405020304" pitchFamily="18" charset="0"/>
+                      </a:endParaRPr>
+                    </a:p>
+                  </a:txBody>
+                  <a:tcPr marL="68580" marR="68580" marT="0" marB="0" anchor="ctr"/>
+                </a:tc>
+                <a:tc>
+                  <a:txBody>
+                    <a:bodyPr/>
+                    <a:lstStyle/>
+                    <a:p>
+                      <a:pPr algn="r">
+                        <a:lnSpc>
+                          <a:spcPct val="107000"/>
+                        </a:lnSpc>
+                        <a:spcAft>
+                          <a:spcPts val="0"/>
+                        </a:spcAft>
+                      </a:pPr>
+                      <a:r>
+                        <a:rPr lang="tr-TR" sz="2000" dirty="0">
+                          <a:effectLst/>
+                        </a:rPr>
+                        <a:t>1 GÜN</a:t>
+                      </a:r>
+                      <a:endParaRPr lang="tr-TR" sz="2000" dirty="0">
+                        <a:effectLst/>
+                        <a:latin typeface="Calibri" panose="020F0502020204030204" pitchFamily="34" charset="0"/>
+                        <a:ea typeface="Calibri" panose="020F0502020204030204" pitchFamily="34" charset="0"/>
+                        <a:cs typeface="Times New Roman" panose="02020603050405020304" pitchFamily="18" charset="0"/>
+                      </a:endParaRPr>
+                    </a:p>
+                  </a:txBody>
+                  <a:tcPr marL="68580" marR="68580" marT="0" marB="0" anchor="ctr"/>
+                </a:tc>
+                <a:tc>
+                  <a:txBody>
+                    <a:bodyPr/>
+                    <a:lstStyle/>
+                    <a:p>
+                      <a:pPr algn="r">
+                        <a:lnSpc>
+                          <a:spcPct val="107000"/>
+                        </a:lnSpc>
+                        <a:spcAft>
+                          <a:spcPts val="0"/>
+                        </a:spcAft>
+                      </a:pPr>
+                      <a:r>
+                        <a:rPr lang="tr-TR" sz="2000">
+                          <a:effectLst/>
+                        </a:rPr>
+                        <a:t>15-16 Mayıs 2019</a:t>
+                      </a:r>
+                      <a:endParaRPr lang="tr-TR" sz="2000">
+                        <a:effectLst/>
+                        <a:latin typeface="Calibri" panose="020F0502020204030204" pitchFamily="34" charset="0"/>
+                        <a:ea typeface="Calibri" panose="020F0502020204030204" pitchFamily="34" charset="0"/>
+                        <a:cs typeface="Times New Roman" panose="02020603050405020304" pitchFamily="18" charset="0"/>
+                      </a:endParaRPr>
+                    </a:p>
+                  </a:txBody>
+                  <a:tcPr marL="68580" marR="68580" marT="0" marB="0" anchor="ctr"/>
+                </a:tc>
+                <a:extLst>
+                  <a:ext uri="{0D108BD9-81ED-4DB2-BD59-A6C34878D82A}">
+                    <a16:rowId xmlns:a16="http://schemas.microsoft.com/office/drawing/2014/main" val="1460201297"/>
+                  </a:ext>
+                </a:extLst>
+              </a:tr>
+              <a:tr h="345926">
+                <a:tc>
+                  <a:txBody>
+                    <a:bodyPr/>
+                    <a:lstStyle/>
+                    <a:p>
+                      <a:pPr algn="ctr">
+                        <a:lnSpc>
+                          <a:spcPct val="107000"/>
+                        </a:lnSpc>
+                        <a:spcAft>
+                          <a:spcPts val="0"/>
+                        </a:spcAft>
+                      </a:pPr>
+                      <a:r>
+                        <a:rPr lang="tr-TR" sz="2000">
+                          <a:effectLst/>
+                        </a:rPr>
+                        <a:t>2.</a:t>
+                      </a:r>
+                      <a:endParaRPr lang="tr-TR" sz="2000">
+                        <a:effectLst/>
+                        <a:latin typeface="Calibri" panose="020F0502020204030204" pitchFamily="34" charset="0"/>
+                        <a:ea typeface="Calibri" panose="020F0502020204030204" pitchFamily="34" charset="0"/>
+                        <a:cs typeface="Times New Roman" panose="02020603050405020304" pitchFamily="18" charset="0"/>
+                      </a:endParaRPr>
+                    </a:p>
+                  </a:txBody>
+                  <a:tcPr marL="68580" marR="68580" marT="0" marB="0" anchor="ctr"/>
+                </a:tc>
+                <a:tc>
+                  <a:txBody>
+                    <a:bodyPr/>
+                    <a:lstStyle/>
+                    <a:p>
+                      <a:pPr>
+                        <a:lnSpc>
+                          <a:spcPct val="107000"/>
+                        </a:lnSpc>
+                        <a:spcAft>
+                          <a:spcPts val="0"/>
+                        </a:spcAft>
+                      </a:pPr>
+                      <a:r>
+                        <a:rPr lang="tr-TR" sz="2000" dirty="0">
+                          <a:effectLst/>
+                        </a:rPr>
+                        <a:t>Data Analysis (Veri Analizi) </a:t>
+                      </a:r>
+                      <a:r>
+                        <a:rPr lang="tr-TR" sz="2000" dirty="0" err="1">
+                          <a:effectLst/>
+                        </a:rPr>
+                        <a:t>Pandas</a:t>
+                      </a:r>
+                      <a:endParaRPr lang="tr-TR" sz="2000" dirty="0">
+                        <a:effectLst/>
+                      </a:endParaRPr>
+                    </a:p>
+                  </a:txBody>
+                  <a:tcPr marL="68580" marR="68580" marT="0" marB="0" anchor="ctr"/>
+                </a:tc>
+                <a:tc>
+                  <a:txBody>
+                    <a:bodyPr/>
+                    <a:lstStyle/>
+                    <a:p>
+                      <a:pPr algn="r">
+                        <a:lnSpc>
+                          <a:spcPct val="107000"/>
+                        </a:lnSpc>
+                        <a:spcAft>
+                          <a:spcPts val="0"/>
+                        </a:spcAft>
+                      </a:pPr>
+                      <a:r>
+                        <a:rPr lang="tr-TR" sz="2000" dirty="0">
+                          <a:effectLst/>
+                        </a:rPr>
+                        <a:t>1 GÜN</a:t>
+                      </a:r>
+                      <a:endParaRPr lang="tr-TR" sz="2000" dirty="0">
+                        <a:effectLst/>
+                        <a:latin typeface="Calibri" panose="020F0502020204030204" pitchFamily="34" charset="0"/>
+                        <a:ea typeface="Calibri" panose="020F0502020204030204" pitchFamily="34" charset="0"/>
+                        <a:cs typeface="Times New Roman" panose="02020603050405020304" pitchFamily="18" charset="0"/>
+                      </a:endParaRPr>
+                    </a:p>
+                  </a:txBody>
+                  <a:tcPr marL="68580" marR="68580" marT="0" marB="0" anchor="ctr"/>
+                </a:tc>
+                <a:tc>
+                  <a:txBody>
+                    <a:bodyPr/>
+                    <a:lstStyle/>
+                    <a:p>
+                      <a:pPr algn="r">
+                        <a:lnSpc>
+                          <a:spcPct val="107000"/>
+                        </a:lnSpc>
+                        <a:spcAft>
+                          <a:spcPts val="0"/>
+                        </a:spcAft>
+                      </a:pPr>
+                      <a:r>
+                        <a:rPr lang="tr-TR" sz="2000">
+                          <a:effectLst/>
+                        </a:rPr>
+                        <a:t>15-16 Mayıs 2019</a:t>
+                      </a:r>
+                      <a:endParaRPr lang="tr-TR" sz="2000">
+                        <a:effectLst/>
+                        <a:latin typeface="Calibri" panose="020F0502020204030204" pitchFamily="34" charset="0"/>
+                        <a:ea typeface="Calibri" panose="020F0502020204030204" pitchFamily="34" charset="0"/>
+                        <a:cs typeface="Times New Roman" panose="02020603050405020304" pitchFamily="18" charset="0"/>
+                      </a:endParaRPr>
+                    </a:p>
+                  </a:txBody>
+                  <a:tcPr marL="68580" marR="68580" marT="0" marB="0" anchor="ctr"/>
+                </a:tc>
+                <a:extLst>
+                  <a:ext uri="{0D108BD9-81ED-4DB2-BD59-A6C34878D82A}">
+                    <a16:rowId xmlns:a16="http://schemas.microsoft.com/office/drawing/2014/main" val="421545223"/>
+                  </a:ext>
+                </a:extLst>
+              </a:tr>
+              <a:tr h="345926">
+                <a:tc>
+                  <a:txBody>
+                    <a:bodyPr/>
+                    <a:lstStyle/>
+                    <a:p>
+                      <a:pPr algn="ctr">
+                        <a:lnSpc>
+                          <a:spcPct val="107000"/>
+                        </a:lnSpc>
+                        <a:spcAft>
+                          <a:spcPts val="0"/>
+                        </a:spcAft>
+                      </a:pPr>
+                      <a:r>
+                        <a:rPr lang="tr-TR" sz="2000">
+                          <a:effectLst/>
+                        </a:rPr>
+                        <a:t>3.</a:t>
+                      </a:r>
+                      <a:endParaRPr lang="tr-TR" sz="2000">
+                        <a:effectLst/>
+                        <a:latin typeface="Calibri" panose="020F0502020204030204" pitchFamily="34" charset="0"/>
+                        <a:ea typeface="Calibri" panose="020F0502020204030204" pitchFamily="34" charset="0"/>
+                        <a:cs typeface="Times New Roman" panose="02020603050405020304" pitchFamily="18" charset="0"/>
+                      </a:endParaRPr>
+                    </a:p>
+                  </a:txBody>
+                  <a:tcPr marL="68580" marR="68580" marT="0" marB="0" anchor="ctr"/>
+                </a:tc>
+                <a:tc>
+                  <a:txBody>
+                    <a:bodyPr/>
+                    <a:lstStyle/>
+                    <a:p>
+                      <a:pPr>
+                        <a:lnSpc>
+                          <a:spcPct val="107000"/>
+                        </a:lnSpc>
+                        <a:spcAft>
+                          <a:spcPts val="0"/>
+                        </a:spcAft>
+                      </a:pPr>
+                      <a:r>
+                        <a:rPr lang="tr-TR" sz="2000" dirty="0">
+                          <a:effectLst/>
+                        </a:rPr>
+                        <a:t>Data Analysis </a:t>
+                      </a:r>
+                      <a:r>
+                        <a:rPr lang="tr-TR" sz="2000" dirty="0" err="1">
+                          <a:effectLst/>
+                        </a:rPr>
+                        <a:t>and</a:t>
+                      </a:r>
+                      <a:r>
+                        <a:rPr lang="tr-TR" sz="2000" dirty="0">
+                          <a:effectLst/>
+                        </a:rPr>
+                        <a:t> </a:t>
+                      </a:r>
+                      <a:r>
+                        <a:rPr lang="tr-TR" sz="2000" dirty="0" err="1">
+                          <a:effectLst/>
+                        </a:rPr>
+                        <a:t>Visualization</a:t>
+                      </a:r>
+                      <a:r>
+                        <a:rPr lang="tr-TR" sz="2000" dirty="0">
+                          <a:effectLst/>
+                        </a:rPr>
+                        <a:t> (Veri Analizi ve Görselleştirme) </a:t>
+                      </a:r>
+                      <a:r>
+                        <a:rPr lang="tr-TR" sz="2000" dirty="0" err="1">
+                          <a:effectLst/>
+                        </a:rPr>
+                        <a:t>Pandas</a:t>
+                      </a:r>
+                      <a:r>
+                        <a:rPr lang="tr-TR" sz="2000" dirty="0">
+                          <a:effectLst/>
+                        </a:rPr>
+                        <a:t> - </a:t>
+                      </a:r>
+                      <a:r>
+                        <a:rPr lang="tr-TR" sz="2000" dirty="0" err="1">
+                          <a:effectLst/>
+                        </a:rPr>
+                        <a:t>Matplotlib</a:t>
+                      </a:r>
+                      <a:endParaRPr lang="tr-TR" sz="2000" dirty="0">
+                        <a:effectLst/>
+                      </a:endParaRPr>
+                    </a:p>
+                  </a:txBody>
+                  <a:tcPr marL="68580" marR="68580" marT="0" marB="0" anchor="ctr"/>
+                </a:tc>
+                <a:tc>
+                  <a:txBody>
+                    <a:bodyPr/>
+                    <a:lstStyle/>
+                    <a:p>
+                      <a:pPr algn="r">
+                        <a:lnSpc>
+                          <a:spcPct val="107000"/>
+                        </a:lnSpc>
+                        <a:spcAft>
+                          <a:spcPts val="0"/>
+                        </a:spcAft>
+                      </a:pPr>
+                      <a:r>
+                        <a:rPr lang="tr-TR" sz="2000">
+                          <a:effectLst/>
+                        </a:rPr>
+                        <a:t>1 GÜN</a:t>
+                      </a:r>
+                      <a:endParaRPr lang="tr-TR" sz="2000">
+                        <a:effectLst/>
+                        <a:latin typeface="Calibri" panose="020F0502020204030204" pitchFamily="34" charset="0"/>
+                        <a:ea typeface="Calibri" panose="020F0502020204030204" pitchFamily="34" charset="0"/>
+                        <a:cs typeface="Times New Roman" panose="02020603050405020304" pitchFamily="18" charset="0"/>
+                      </a:endParaRPr>
+                    </a:p>
+                  </a:txBody>
+                  <a:tcPr marL="68580" marR="68580" marT="0" marB="0" anchor="ctr"/>
+                </a:tc>
+                <a:tc>
+                  <a:txBody>
+                    <a:bodyPr/>
+                    <a:lstStyle/>
+                    <a:p>
+                      <a:pPr algn="r">
+                        <a:lnSpc>
+                          <a:spcPct val="107000"/>
+                        </a:lnSpc>
+                        <a:spcAft>
+                          <a:spcPts val="0"/>
+                        </a:spcAft>
+                      </a:pPr>
+                      <a:r>
+                        <a:rPr lang="tr-TR" sz="2000">
+                          <a:effectLst/>
+                        </a:rPr>
+                        <a:t>22-24 Mayıs 2019</a:t>
+                      </a:r>
+                      <a:endParaRPr lang="tr-TR" sz="2000">
+                        <a:effectLst/>
+                        <a:latin typeface="Calibri" panose="020F0502020204030204" pitchFamily="34" charset="0"/>
+                        <a:ea typeface="Calibri" panose="020F0502020204030204" pitchFamily="34" charset="0"/>
+                        <a:cs typeface="Times New Roman" panose="02020603050405020304" pitchFamily="18" charset="0"/>
+                      </a:endParaRPr>
+                    </a:p>
+                  </a:txBody>
+                  <a:tcPr marL="68580" marR="68580" marT="0" marB="0" anchor="ctr"/>
+                </a:tc>
+                <a:extLst>
+                  <a:ext uri="{0D108BD9-81ED-4DB2-BD59-A6C34878D82A}">
+                    <a16:rowId xmlns:a16="http://schemas.microsoft.com/office/drawing/2014/main" val="931383074"/>
+                  </a:ext>
+                </a:extLst>
+              </a:tr>
+              <a:tr h="345926">
+                <a:tc>
+                  <a:txBody>
+                    <a:bodyPr/>
+                    <a:lstStyle/>
+                    <a:p>
+                      <a:pPr algn="ctr">
+                        <a:lnSpc>
+                          <a:spcPct val="107000"/>
+                        </a:lnSpc>
+                        <a:spcAft>
+                          <a:spcPts val="0"/>
+                        </a:spcAft>
+                      </a:pPr>
+                      <a:r>
+                        <a:rPr lang="tr-TR" sz="2000">
+                          <a:effectLst/>
+                        </a:rPr>
+                        <a:t>4.</a:t>
+                      </a:r>
+                      <a:endParaRPr lang="tr-TR" sz="2000">
+                        <a:effectLst/>
+                        <a:latin typeface="Calibri" panose="020F0502020204030204" pitchFamily="34" charset="0"/>
+                        <a:ea typeface="Calibri" panose="020F0502020204030204" pitchFamily="34" charset="0"/>
+                        <a:cs typeface="Times New Roman" panose="02020603050405020304" pitchFamily="18" charset="0"/>
+                      </a:endParaRPr>
+                    </a:p>
+                  </a:txBody>
+                  <a:tcPr marL="68580" marR="68580" marT="0" marB="0" anchor="ctr"/>
+                </a:tc>
+                <a:tc>
+                  <a:txBody>
+                    <a:bodyPr/>
+                    <a:lstStyle/>
+                    <a:p>
+                      <a:pPr marL="0" marR="0" lvl="0" indent="0" algn="l" defTabSz="914400" rtl="0" eaLnBrk="1" fontAlgn="auto" latinLnBrk="0" hangingPunct="1">
+                        <a:lnSpc>
+                          <a:spcPct val="107000"/>
+                        </a:lnSpc>
+                        <a:spcBef>
+                          <a:spcPts val="0"/>
+                        </a:spcBef>
+                        <a:spcAft>
+                          <a:spcPts val="0"/>
+                        </a:spcAft>
+                        <a:buClrTx/>
+                        <a:buSzTx/>
+                        <a:buFontTx/>
+                        <a:buNone/>
+                        <a:tabLst/>
+                        <a:defRPr/>
+                      </a:pPr>
+                      <a:r>
+                        <a:rPr lang="tr-TR" sz="2000" dirty="0">
+                          <a:effectLst/>
+                        </a:rPr>
+                        <a:t>Data </a:t>
+                      </a:r>
+                      <a:r>
+                        <a:rPr lang="tr-TR" sz="2000" dirty="0" err="1">
+                          <a:effectLst/>
+                        </a:rPr>
+                        <a:t>Preprocessing</a:t>
+                      </a:r>
+                      <a:r>
+                        <a:rPr lang="tr-TR" sz="2000" dirty="0">
+                          <a:effectLst/>
+                        </a:rPr>
+                        <a:t> (Veri Ön İşleme)</a:t>
+                      </a:r>
+                      <a:endParaRPr lang="tr-TR" sz="2000" dirty="0">
+                        <a:effectLst/>
+                        <a:latin typeface="Calibri" panose="020F0502020204030204" pitchFamily="34" charset="0"/>
+                        <a:ea typeface="Calibri" panose="020F0502020204030204" pitchFamily="34" charset="0"/>
+                        <a:cs typeface="Times New Roman" panose="02020603050405020304" pitchFamily="18" charset="0"/>
+                      </a:endParaRPr>
+                    </a:p>
+                    <a:p>
+                      <a:pPr>
+                        <a:lnSpc>
+                          <a:spcPct val="107000"/>
+                        </a:lnSpc>
+                        <a:spcAft>
+                          <a:spcPts val="0"/>
+                        </a:spcAft>
+                      </a:pPr>
+                      <a:r>
+                        <a:rPr lang="tr-TR" sz="2000" dirty="0">
+                          <a:effectLst/>
+                        </a:rPr>
+                        <a:t>Data </a:t>
+                      </a:r>
+                      <a:r>
+                        <a:rPr lang="tr-TR" sz="2000" dirty="0" err="1">
+                          <a:effectLst/>
+                        </a:rPr>
+                        <a:t>Cleaning</a:t>
+                      </a:r>
+                      <a:r>
+                        <a:rPr lang="tr-TR" sz="2000" dirty="0">
+                          <a:effectLst/>
+                        </a:rPr>
+                        <a:t> (Veri Temizleme)</a:t>
+                      </a:r>
+                    </a:p>
+                    <a:p>
+                      <a:pPr marL="0" marR="0" lvl="0" indent="0" algn="l" defTabSz="914400" rtl="0" eaLnBrk="1" fontAlgn="auto" latinLnBrk="0" hangingPunct="1">
+                        <a:lnSpc>
+                          <a:spcPct val="107000"/>
+                        </a:lnSpc>
+                        <a:spcBef>
+                          <a:spcPts val="0"/>
+                        </a:spcBef>
+                        <a:spcAft>
+                          <a:spcPts val="0"/>
+                        </a:spcAft>
+                        <a:buClrTx/>
+                        <a:buSzTx/>
+                        <a:buFontTx/>
+                        <a:buNone/>
+                        <a:tabLst/>
+                        <a:defRPr/>
+                      </a:pPr>
+                      <a:r>
+                        <a:rPr lang="tr-TR" sz="2000" dirty="0">
+                          <a:effectLst/>
+                        </a:rPr>
+                        <a:t>ETL (</a:t>
+                      </a:r>
+                      <a:r>
+                        <a:rPr lang="tr-TR" sz="2000" dirty="0" err="1">
+                          <a:effectLst/>
+                        </a:rPr>
+                        <a:t>Extract</a:t>
+                      </a:r>
+                      <a:r>
+                        <a:rPr lang="tr-TR" sz="2000" dirty="0">
+                          <a:effectLst/>
+                        </a:rPr>
+                        <a:t>, </a:t>
+                      </a:r>
+                      <a:r>
+                        <a:rPr lang="tr-TR" sz="2000" dirty="0" err="1">
+                          <a:effectLst/>
+                        </a:rPr>
+                        <a:t>Transform</a:t>
+                      </a:r>
+                      <a:r>
+                        <a:rPr lang="tr-TR" sz="2000" dirty="0">
+                          <a:effectLst/>
+                        </a:rPr>
+                        <a:t> </a:t>
+                      </a:r>
+                      <a:r>
+                        <a:rPr lang="tr-TR" sz="2000" dirty="0" err="1">
+                          <a:effectLst/>
+                        </a:rPr>
+                        <a:t>and</a:t>
+                      </a:r>
+                      <a:r>
+                        <a:rPr lang="tr-TR" sz="2000" dirty="0">
+                          <a:effectLst/>
+                        </a:rPr>
+                        <a:t> </a:t>
+                      </a:r>
+                      <a:r>
+                        <a:rPr lang="tr-TR" sz="2000" dirty="0" err="1">
+                          <a:effectLst/>
+                        </a:rPr>
+                        <a:t>Load</a:t>
+                      </a:r>
+                      <a:r>
+                        <a:rPr lang="tr-TR" sz="2000" dirty="0">
+                          <a:effectLst/>
+                        </a:rPr>
+                        <a:t>)</a:t>
+                      </a:r>
+                      <a:endParaRPr lang="tr-TR" sz="2000" dirty="0">
+                        <a:effectLst/>
+                        <a:latin typeface="Calibri" panose="020F0502020204030204" pitchFamily="34" charset="0"/>
+                        <a:ea typeface="Calibri" panose="020F0502020204030204" pitchFamily="34" charset="0"/>
+                        <a:cs typeface="Times New Roman" panose="02020603050405020304" pitchFamily="18" charset="0"/>
+                      </a:endParaRPr>
+                    </a:p>
+                  </a:txBody>
+                  <a:tcPr marL="68580" marR="68580" marT="0" marB="0" anchor="ctr"/>
+                </a:tc>
+                <a:tc>
+                  <a:txBody>
+                    <a:bodyPr/>
+                    <a:lstStyle/>
+                    <a:p>
+                      <a:pPr algn="r">
+                        <a:lnSpc>
+                          <a:spcPct val="107000"/>
+                        </a:lnSpc>
+                        <a:spcAft>
+                          <a:spcPts val="0"/>
+                        </a:spcAft>
+                      </a:pPr>
+                      <a:r>
+                        <a:rPr lang="tr-TR" sz="2000">
+                          <a:effectLst/>
+                        </a:rPr>
+                        <a:t>2 GÜN</a:t>
+                      </a:r>
+                      <a:endParaRPr lang="tr-TR" sz="2000">
+                        <a:effectLst/>
+                        <a:latin typeface="Calibri" panose="020F0502020204030204" pitchFamily="34" charset="0"/>
+                        <a:ea typeface="Calibri" panose="020F0502020204030204" pitchFamily="34" charset="0"/>
+                        <a:cs typeface="Times New Roman" panose="02020603050405020304" pitchFamily="18" charset="0"/>
+                      </a:endParaRPr>
+                    </a:p>
+                  </a:txBody>
+                  <a:tcPr marL="68580" marR="68580" marT="0" marB="0" anchor="ctr"/>
+                </a:tc>
+                <a:tc>
+                  <a:txBody>
+                    <a:bodyPr/>
+                    <a:lstStyle/>
+                    <a:p>
+                      <a:pPr algn="r">
+                        <a:lnSpc>
+                          <a:spcPct val="107000"/>
+                        </a:lnSpc>
+                        <a:spcAft>
+                          <a:spcPts val="0"/>
+                        </a:spcAft>
+                      </a:pPr>
+                      <a:r>
+                        <a:rPr lang="tr-TR" sz="2000">
+                          <a:effectLst/>
+                        </a:rPr>
+                        <a:t>22-24 Mayıs 2019</a:t>
+                      </a:r>
+                      <a:endParaRPr lang="tr-TR" sz="2000">
+                        <a:effectLst/>
+                        <a:latin typeface="Calibri" panose="020F0502020204030204" pitchFamily="34" charset="0"/>
+                        <a:ea typeface="Calibri" panose="020F0502020204030204" pitchFamily="34" charset="0"/>
+                        <a:cs typeface="Times New Roman" panose="02020603050405020304" pitchFamily="18" charset="0"/>
+                      </a:endParaRPr>
+                    </a:p>
+                  </a:txBody>
+                  <a:tcPr marL="68580" marR="68580" marT="0" marB="0" anchor="ctr"/>
+                </a:tc>
+                <a:extLst>
+                  <a:ext uri="{0D108BD9-81ED-4DB2-BD59-A6C34878D82A}">
+                    <a16:rowId xmlns:a16="http://schemas.microsoft.com/office/drawing/2014/main" val="1451060185"/>
+                  </a:ext>
+                </a:extLst>
+              </a:tr>
+              <a:tr h="345926">
+                <a:tc>
+                  <a:txBody>
+                    <a:bodyPr/>
+                    <a:lstStyle/>
+                    <a:p>
+                      <a:pPr algn="ctr">
+                        <a:lnSpc>
+                          <a:spcPct val="107000"/>
+                        </a:lnSpc>
+                        <a:spcAft>
+                          <a:spcPts val="0"/>
+                        </a:spcAft>
+                      </a:pPr>
+                      <a:r>
+                        <a:rPr lang="tr-TR" sz="2000">
+                          <a:effectLst/>
+                        </a:rPr>
+                        <a:t>5.</a:t>
+                      </a:r>
+                      <a:endParaRPr lang="tr-TR" sz="2000">
+                        <a:effectLst/>
+                        <a:latin typeface="Calibri" panose="020F0502020204030204" pitchFamily="34" charset="0"/>
+                        <a:ea typeface="Calibri" panose="020F0502020204030204" pitchFamily="34" charset="0"/>
+                        <a:cs typeface="Times New Roman" panose="02020603050405020304" pitchFamily="18" charset="0"/>
+                      </a:endParaRPr>
+                    </a:p>
+                  </a:txBody>
+                  <a:tcPr marL="68580" marR="68580" marT="0" marB="0" anchor="ctr"/>
+                </a:tc>
+                <a:tc>
+                  <a:txBody>
+                    <a:bodyPr/>
+                    <a:lstStyle/>
+                    <a:p>
+                      <a:pPr>
+                        <a:lnSpc>
+                          <a:spcPct val="107000"/>
+                        </a:lnSpc>
+                        <a:spcAft>
+                          <a:spcPts val="0"/>
+                        </a:spcAft>
+                      </a:pPr>
+                      <a:r>
+                        <a:rPr lang="tr-TR" sz="2000">
+                          <a:effectLst/>
+                        </a:rPr>
+                        <a:t>Machine Learning (Makine Öğrenmesi)</a:t>
+                      </a:r>
+                      <a:endParaRPr lang="tr-TR" sz="2000">
+                        <a:effectLst/>
+                        <a:latin typeface="Calibri" panose="020F0502020204030204" pitchFamily="34" charset="0"/>
+                        <a:ea typeface="Calibri" panose="020F0502020204030204" pitchFamily="34" charset="0"/>
+                        <a:cs typeface="Times New Roman" panose="02020603050405020304" pitchFamily="18" charset="0"/>
+                      </a:endParaRPr>
+                    </a:p>
+                  </a:txBody>
+                  <a:tcPr marL="68580" marR="68580" marT="0" marB="0" anchor="ctr"/>
+                </a:tc>
+                <a:tc>
+                  <a:txBody>
+                    <a:bodyPr/>
+                    <a:lstStyle/>
+                    <a:p>
+                      <a:pPr algn="r">
+                        <a:lnSpc>
+                          <a:spcPct val="107000"/>
+                        </a:lnSpc>
+                        <a:spcAft>
+                          <a:spcPts val="0"/>
+                        </a:spcAft>
+                      </a:pPr>
+                      <a:r>
+                        <a:rPr lang="tr-TR" sz="2000">
+                          <a:effectLst/>
+                        </a:rPr>
+                        <a:t>3 GÜN</a:t>
+                      </a:r>
+                      <a:endParaRPr lang="tr-TR" sz="2000">
+                        <a:effectLst/>
+                        <a:latin typeface="Calibri" panose="020F0502020204030204" pitchFamily="34" charset="0"/>
+                        <a:ea typeface="Calibri" panose="020F0502020204030204" pitchFamily="34" charset="0"/>
+                        <a:cs typeface="Times New Roman" panose="02020603050405020304" pitchFamily="18" charset="0"/>
+                      </a:endParaRPr>
+                    </a:p>
+                  </a:txBody>
+                  <a:tcPr marL="68580" marR="68580" marT="0" marB="0" anchor="ctr"/>
+                </a:tc>
+                <a:tc>
+                  <a:txBody>
+                    <a:bodyPr/>
+                    <a:lstStyle/>
+                    <a:p>
+                      <a:pPr algn="r">
+                        <a:lnSpc>
+                          <a:spcPct val="107000"/>
+                        </a:lnSpc>
+                        <a:spcAft>
+                          <a:spcPts val="0"/>
+                        </a:spcAft>
+                      </a:pPr>
+                      <a:r>
+                        <a:rPr lang="tr-TR" sz="2000">
+                          <a:effectLst/>
+                        </a:rPr>
+                        <a:t>02-04 Temmuz 2019</a:t>
+                      </a:r>
+                      <a:endParaRPr lang="tr-TR" sz="2000">
+                        <a:effectLst/>
+                        <a:latin typeface="Calibri" panose="020F0502020204030204" pitchFamily="34" charset="0"/>
+                        <a:ea typeface="Calibri" panose="020F0502020204030204" pitchFamily="34" charset="0"/>
+                        <a:cs typeface="Times New Roman" panose="02020603050405020304" pitchFamily="18" charset="0"/>
+                      </a:endParaRPr>
+                    </a:p>
+                  </a:txBody>
+                  <a:tcPr marL="68580" marR="68580" marT="0" marB="0" anchor="ctr"/>
+                </a:tc>
+                <a:extLst>
+                  <a:ext uri="{0D108BD9-81ED-4DB2-BD59-A6C34878D82A}">
+                    <a16:rowId xmlns:a16="http://schemas.microsoft.com/office/drawing/2014/main" val="1886510784"/>
+                  </a:ext>
+                </a:extLst>
+              </a:tr>
+              <a:tr h="345926">
+                <a:tc>
+                  <a:txBody>
+                    <a:bodyPr/>
+                    <a:lstStyle/>
+                    <a:p>
+                      <a:pPr algn="ctr">
+                        <a:lnSpc>
+                          <a:spcPct val="107000"/>
+                        </a:lnSpc>
+                        <a:spcAft>
+                          <a:spcPts val="0"/>
+                        </a:spcAft>
+                      </a:pPr>
+                      <a:r>
+                        <a:rPr lang="tr-TR" sz="2000">
+                          <a:effectLst/>
+                        </a:rPr>
+                        <a:t>6.</a:t>
+                      </a:r>
+                      <a:endParaRPr lang="tr-TR" sz="2000">
+                        <a:effectLst/>
+                        <a:latin typeface="Calibri" panose="020F0502020204030204" pitchFamily="34" charset="0"/>
+                        <a:ea typeface="Calibri" panose="020F0502020204030204" pitchFamily="34" charset="0"/>
+                        <a:cs typeface="Times New Roman" panose="02020603050405020304" pitchFamily="18" charset="0"/>
+                      </a:endParaRPr>
+                    </a:p>
+                  </a:txBody>
+                  <a:tcPr marL="68580" marR="68580" marT="0" marB="0" anchor="ctr"/>
+                </a:tc>
+                <a:tc>
+                  <a:txBody>
+                    <a:bodyPr/>
+                    <a:lstStyle/>
+                    <a:p>
+                      <a:pPr>
+                        <a:lnSpc>
+                          <a:spcPct val="107000"/>
+                        </a:lnSpc>
+                        <a:spcAft>
+                          <a:spcPts val="0"/>
+                        </a:spcAft>
+                      </a:pPr>
+                      <a:r>
+                        <a:rPr lang="tr-TR" sz="2000">
+                          <a:effectLst/>
+                        </a:rPr>
+                        <a:t>Deep Learning (Derin Öğrenme)</a:t>
+                      </a:r>
+                      <a:endParaRPr lang="tr-TR" sz="2000">
+                        <a:effectLst/>
+                        <a:latin typeface="Calibri" panose="020F0502020204030204" pitchFamily="34" charset="0"/>
+                        <a:ea typeface="Calibri" panose="020F0502020204030204" pitchFamily="34" charset="0"/>
+                        <a:cs typeface="Times New Roman" panose="02020603050405020304" pitchFamily="18" charset="0"/>
+                      </a:endParaRPr>
+                    </a:p>
+                  </a:txBody>
+                  <a:tcPr marL="68580" marR="68580" marT="0" marB="0" anchor="ctr"/>
+                </a:tc>
+                <a:tc>
+                  <a:txBody>
+                    <a:bodyPr/>
+                    <a:lstStyle/>
+                    <a:p>
+                      <a:pPr algn="r">
+                        <a:lnSpc>
+                          <a:spcPct val="107000"/>
+                        </a:lnSpc>
+                        <a:spcAft>
+                          <a:spcPts val="0"/>
+                        </a:spcAft>
+                      </a:pPr>
+                      <a:r>
+                        <a:rPr lang="tr-TR" sz="2000">
+                          <a:effectLst/>
+                        </a:rPr>
+                        <a:t>1 GÜN</a:t>
+                      </a:r>
+                      <a:endParaRPr lang="tr-TR" sz="2000">
+                        <a:effectLst/>
+                        <a:latin typeface="Calibri" panose="020F0502020204030204" pitchFamily="34" charset="0"/>
+                        <a:ea typeface="Calibri" panose="020F0502020204030204" pitchFamily="34" charset="0"/>
+                        <a:cs typeface="Times New Roman" panose="02020603050405020304" pitchFamily="18" charset="0"/>
+                      </a:endParaRPr>
+                    </a:p>
+                  </a:txBody>
+                  <a:tcPr marL="68580" marR="68580" marT="0" marB="0" anchor="ctr"/>
+                </a:tc>
+                <a:tc>
+                  <a:txBody>
+                    <a:bodyPr/>
+                    <a:lstStyle/>
+                    <a:p>
+                      <a:pPr algn="r">
+                        <a:lnSpc>
+                          <a:spcPct val="107000"/>
+                        </a:lnSpc>
+                        <a:spcAft>
+                          <a:spcPts val="0"/>
+                        </a:spcAft>
+                      </a:pPr>
+                      <a:r>
+                        <a:rPr lang="tr-TR" sz="2000">
+                          <a:effectLst/>
+                        </a:rPr>
+                        <a:t>09-10 Temmuz 2019</a:t>
+                      </a:r>
+                      <a:endParaRPr lang="tr-TR" sz="2000">
+                        <a:effectLst/>
+                        <a:latin typeface="Calibri" panose="020F0502020204030204" pitchFamily="34" charset="0"/>
+                        <a:ea typeface="Calibri" panose="020F0502020204030204" pitchFamily="34" charset="0"/>
+                        <a:cs typeface="Times New Roman" panose="02020603050405020304" pitchFamily="18" charset="0"/>
+                      </a:endParaRPr>
+                    </a:p>
+                  </a:txBody>
+                  <a:tcPr marL="68580" marR="68580" marT="0" marB="0" anchor="ctr"/>
+                </a:tc>
+                <a:extLst>
+                  <a:ext uri="{0D108BD9-81ED-4DB2-BD59-A6C34878D82A}">
+                    <a16:rowId xmlns:a16="http://schemas.microsoft.com/office/drawing/2014/main" val="3393793733"/>
+                  </a:ext>
+                </a:extLst>
+              </a:tr>
+              <a:tr h="707869">
+                <a:tc>
+                  <a:txBody>
+                    <a:bodyPr/>
+                    <a:lstStyle/>
+                    <a:p>
+                      <a:pPr algn="ctr">
+                        <a:lnSpc>
+                          <a:spcPct val="107000"/>
+                        </a:lnSpc>
+                        <a:spcAft>
+                          <a:spcPts val="0"/>
+                        </a:spcAft>
+                      </a:pPr>
+                      <a:r>
+                        <a:rPr lang="tr-TR" sz="2000">
+                          <a:effectLst/>
+                        </a:rPr>
+                        <a:t>7.</a:t>
+                      </a:r>
+                      <a:endParaRPr lang="tr-TR" sz="2000">
+                        <a:effectLst/>
+                        <a:latin typeface="Calibri" panose="020F0502020204030204" pitchFamily="34" charset="0"/>
+                        <a:ea typeface="Calibri" panose="020F0502020204030204" pitchFamily="34" charset="0"/>
+                        <a:cs typeface="Times New Roman" panose="02020603050405020304" pitchFamily="18" charset="0"/>
+                      </a:endParaRPr>
+                    </a:p>
+                  </a:txBody>
+                  <a:tcPr marL="68580" marR="68580" marT="0" marB="0" anchor="ctr"/>
+                </a:tc>
+                <a:tc>
+                  <a:txBody>
+                    <a:bodyPr/>
+                    <a:lstStyle/>
+                    <a:p>
+                      <a:pPr>
+                        <a:lnSpc>
+                          <a:spcPct val="107000"/>
+                        </a:lnSpc>
+                        <a:spcAft>
+                          <a:spcPts val="0"/>
+                        </a:spcAft>
+                      </a:pPr>
+                      <a:r>
+                        <a:rPr lang="tr-TR" sz="2000">
+                          <a:effectLst/>
+                        </a:rPr>
+                        <a:t>Big Data (Büyük Veri)</a:t>
+                      </a:r>
+                      <a:endParaRPr lang="tr-TR" sz="2000">
+                        <a:effectLst/>
+                        <a:latin typeface="Calibri" panose="020F0502020204030204" pitchFamily="34" charset="0"/>
+                        <a:ea typeface="Calibri" panose="020F0502020204030204" pitchFamily="34" charset="0"/>
+                        <a:cs typeface="Times New Roman" panose="02020603050405020304" pitchFamily="18" charset="0"/>
+                      </a:endParaRPr>
+                    </a:p>
+                  </a:txBody>
+                  <a:tcPr marL="68580" marR="68580" marT="0" marB="0" anchor="ctr"/>
+                </a:tc>
+                <a:tc>
+                  <a:txBody>
+                    <a:bodyPr/>
+                    <a:lstStyle/>
+                    <a:p>
+                      <a:pPr algn="r">
+                        <a:lnSpc>
+                          <a:spcPct val="107000"/>
+                        </a:lnSpc>
+                        <a:spcAft>
+                          <a:spcPts val="0"/>
+                        </a:spcAft>
+                      </a:pPr>
+                      <a:r>
+                        <a:rPr lang="tr-TR" sz="2000">
+                          <a:effectLst/>
+                        </a:rPr>
+                        <a:t>3 GÜN</a:t>
+                      </a:r>
+                      <a:endParaRPr lang="tr-TR" sz="2000">
+                        <a:effectLst/>
+                        <a:latin typeface="Calibri" panose="020F0502020204030204" pitchFamily="34" charset="0"/>
+                        <a:ea typeface="Calibri" panose="020F0502020204030204" pitchFamily="34" charset="0"/>
+                        <a:cs typeface="Times New Roman" panose="02020603050405020304" pitchFamily="18" charset="0"/>
+                      </a:endParaRPr>
+                    </a:p>
+                  </a:txBody>
+                  <a:tcPr marL="68580" marR="68580" marT="0" marB="0" anchor="ctr"/>
+                </a:tc>
+                <a:tc>
+                  <a:txBody>
+                    <a:bodyPr/>
+                    <a:lstStyle/>
+                    <a:p>
+                      <a:pPr algn="r">
+                        <a:lnSpc>
+                          <a:spcPct val="107000"/>
+                        </a:lnSpc>
+                        <a:spcAft>
+                          <a:spcPts val="0"/>
+                        </a:spcAft>
+                      </a:pPr>
+                      <a:r>
+                        <a:rPr lang="tr-TR" sz="2000">
+                          <a:effectLst/>
+                        </a:rPr>
+                        <a:t>09-10 Temmuz 2019</a:t>
+                      </a:r>
+                    </a:p>
+                    <a:p>
+                      <a:pPr algn="r">
+                        <a:lnSpc>
+                          <a:spcPct val="107000"/>
+                        </a:lnSpc>
+                        <a:spcAft>
+                          <a:spcPts val="0"/>
+                        </a:spcAft>
+                      </a:pPr>
+                      <a:r>
+                        <a:rPr lang="tr-TR" sz="2000">
+                          <a:effectLst/>
+                        </a:rPr>
+                        <a:t>16-17 Temmuz 2019</a:t>
+                      </a:r>
+                      <a:endParaRPr lang="tr-TR" sz="2000">
+                        <a:effectLst/>
+                        <a:latin typeface="Calibri" panose="020F0502020204030204" pitchFamily="34" charset="0"/>
+                        <a:ea typeface="Calibri" panose="020F0502020204030204" pitchFamily="34" charset="0"/>
+                        <a:cs typeface="Times New Roman" panose="02020603050405020304" pitchFamily="18" charset="0"/>
+                      </a:endParaRPr>
+                    </a:p>
+                  </a:txBody>
+                  <a:tcPr marL="68580" marR="68580" marT="0" marB="0" anchor="ctr"/>
+                </a:tc>
+                <a:extLst>
+                  <a:ext uri="{0D108BD9-81ED-4DB2-BD59-A6C34878D82A}">
+                    <a16:rowId xmlns:a16="http://schemas.microsoft.com/office/drawing/2014/main" val="692141347"/>
+                  </a:ext>
+                </a:extLst>
+              </a:tr>
+              <a:tr h="345926">
+                <a:tc>
+                  <a:txBody>
+                    <a:bodyPr/>
+                    <a:lstStyle/>
+                    <a:p>
+                      <a:pPr algn="ctr">
+                        <a:lnSpc>
+                          <a:spcPct val="107000"/>
+                        </a:lnSpc>
+                        <a:spcAft>
+                          <a:spcPts val="0"/>
+                        </a:spcAft>
+                      </a:pPr>
+                      <a:r>
+                        <a:rPr lang="tr-TR" sz="2000">
+                          <a:effectLst/>
+                        </a:rPr>
+                        <a:t> </a:t>
+                      </a:r>
+                      <a:endParaRPr lang="tr-TR" sz="2000">
+                        <a:effectLst/>
+                        <a:latin typeface="Calibri" panose="020F0502020204030204" pitchFamily="34" charset="0"/>
+                        <a:ea typeface="Calibri" panose="020F0502020204030204" pitchFamily="34" charset="0"/>
+                        <a:cs typeface="Times New Roman" panose="02020603050405020304" pitchFamily="18" charset="0"/>
+                      </a:endParaRPr>
+                    </a:p>
+                  </a:txBody>
+                  <a:tcPr marL="68580" marR="68580" marT="0" marB="0" anchor="ctr"/>
+                </a:tc>
+                <a:tc>
+                  <a:txBody>
+                    <a:bodyPr/>
+                    <a:lstStyle/>
+                    <a:p>
+                      <a:pPr>
+                        <a:lnSpc>
+                          <a:spcPct val="107000"/>
+                        </a:lnSpc>
+                        <a:spcAft>
+                          <a:spcPts val="0"/>
+                        </a:spcAft>
+                      </a:pPr>
+                      <a:r>
+                        <a:rPr lang="tr-TR" sz="2000">
+                          <a:effectLst/>
+                        </a:rPr>
+                        <a:t>TOPLAM</a:t>
+                      </a:r>
+                      <a:endParaRPr lang="tr-TR" sz="2000">
+                        <a:effectLst/>
+                        <a:latin typeface="Calibri" panose="020F0502020204030204" pitchFamily="34" charset="0"/>
+                        <a:ea typeface="Calibri" panose="020F0502020204030204" pitchFamily="34" charset="0"/>
+                        <a:cs typeface="Times New Roman" panose="02020603050405020304" pitchFamily="18" charset="0"/>
+                      </a:endParaRPr>
+                    </a:p>
+                  </a:txBody>
+                  <a:tcPr marL="68580" marR="68580" marT="0" marB="0" anchor="ctr"/>
+                </a:tc>
+                <a:tc>
+                  <a:txBody>
+                    <a:bodyPr/>
+                    <a:lstStyle/>
+                    <a:p>
+                      <a:pPr algn="r">
+                        <a:lnSpc>
+                          <a:spcPct val="107000"/>
+                        </a:lnSpc>
+                        <a:spcAft>
+                          <a:spcPts val="0"/>
+                        </a:spcAft>
+                      </a:pPr>
+                      <a:r>
+                        <a:rPr lang="tr-TR" sz="2000">
+                          <a:effectLst/>
+                        </a:rPr>
+                        <a:t>12 GÜN</a:t>
+                      </a:r>
+                      <a:endParaRPr lang="tr-TR" sz="2000">
+                        <a:effectLst/>
+                        <a:latin typeface="Calibri" panose="020F0502020204030204" pitchFamily="34" charset="0"/>
+                        <a:ea typeface="Calibri" panose="020F0502020204030204" pitchFamily="34" charset="0"/>
+                        <a:cs typeface="Times New Roman" panose="02020603050405020304" pitchFamily="18" charset="0"/>
+                      </a:endParaRPr>
+                    </a:p>
+                  </a:txBody>
+                  <a:tcPr marL="68580" marR="68580" marT="0" marB="0" anchor="ctr"/>
+                </a:tc>
+                <a:tc>
+                  <a:txBody>
+                    <a:bodyPr/>
+                    <a:lstStyle/>
+                    <a:p>
+                      <a:pPr algn="ctr">
+                        <a:lnSpc>
+                          <a:spcPct val="107000"/>
+                        </a:lnSpc>
+                        <a:spcAft>
+                          <a:spcPts val="0"/>
+                        </a:spcAft>
+                      </a:pPr>
+                      <a:r>
+                        <a:rPr lang="tr-TR" sz="2000" dirty="0">
+                          <a:effectLst/>
+                        </a:rPr>
+                        <a:t> </a:t>
+                      </a:r>
+                      <a:endParaRPr lang="tr-TR" sz="2000" dirty="0">
+                        <a:effectLst/>
+                        <a:latin typeface="Calibri" panose="020F0502020204030204" pitchFamily="34" charset="0"/>
+                        <a:ea typeface="Calibri" panose="020F0502020204030204" pitchFamily="34" charset="0"/>
+                        <a:cs typeface="Times New Roman" panose="02020603050405020304" pitchFamily="18" charset="0"/>
+                      </a:endParaRPr>
+                    </a:p>
+                  </a:txBody>
+                  <a:tcPr marL="68580" marR="68580" marT="0" marB="0" anchor="ctr"/>
+                </a:tc>
+                <a:extLst>
+                  <a:ext uri="{0D108BD9-81ED-4DB2-BD59-A6C34878D82A}">
+                    <a16:rowId xmlns:a16="http://schemas.microsoft.com/office/drawing/2014/main" val="970063031"/>
+                  </a:ext>
+                </a:extLst>
+              </a:tr>
+            </a:tbl>
+          </a:graphicData>
+        </a:graphic>
+      </p:graphicFrame>
+    </p:spTree>
+    <p:extLst>
+      <p:ext uri="{BB962C8B-B14F-4D97-AF65-F5344CB8AC3E}">
+        <p14:creationId xmlns:p14="http://schemas.microsoft.com/office/powerpoint/2010/main" val="2360627406"/>
+      </p:ext>
+    </p:extLst>
+  </p:cSld>
+  <p:clrMapOvr>
+    <a:masterClrMapping/>
+  </p:clrMapOvr>
+  <p:transition spd="slow">
+    <p:push dir="u"/>
+  </p:transition>
+</p:sld>
+</file>
+
+<file path=ppt/slides/slide7.xml><?xml version="1.0" encoding="utf-8"?>
+<p:sld xmlns:a="http://schemas.openxmlformats.org/drawingml/2006/main" xmlns:r="http://schemas.openxmlformats.org/officeDocument/2006/relationships" xmlns:p="http://schemas.openxmlformats.org/presentationml/2006/main">
+  <p:cSld>
+    <p:spTree>
+      <p:nvGrpSpPr>
+        <p:cNvPr id="1" name=""/>
+        <p:cNvGrpSpPr/>
+        <p:nvPr/>
+      </p:nvGrpSpPr>
+      <p:grpSpPr>
+        <a:xfrm>
+          <a:off x="0" y="0"/>
+          <a:ext cx="0" cy="0"/>
+          <a:chOff x="0" y="0"/>
+          <a:chExt cx="0" cy="0"/>
+        </a:xfrm>
+      </p:grpSpPr>
+      <p:sp>
+        <p:nvSpPr>
+          <p:cNvPr id="16" name="Unvan 1"/>
+          <p:cNvSpPr>
+            <a:spLocks noGrp="1"/>
+          </p:cNvSpPr>
+          <p:nvPr>
+            <p:ph type="ctrTitle"/>
+          </p:nvPr>
+        </p:nvSpPr>
+        <p:spPr>
+          <a:xfrm>
+            <a:off x="1535501" y="304799"/>
+            <a:ext cx="9188569" cy="980537"/>
+          </a:xfrm>
+        </p:spPr>
+        <p:txBody>
+          <a:bodyPr>
+            <a:noAutofit/>
+          </a:bodyPr>
+          <a:lstStyle/>
+          <a:p>
+            <a:r>
+              <a:rPr lang="tr-TR" sz="3200" b="1" dirty="0">
+                <a:solidFill>
+                  <a:srgbClr val="FF4D4D"/>
+                </a:solidFill>
+                <a:latin typeface="Roboto"/>
+                <a:ea typeface="+mn-ea"/>
+                <a:cs typeface="+mn-cs"/>
+              </a:rPr>
+              <a:t>Eğitimde Kullanılacak İşletim Sistemi, Donanım ve Yazılımlar</a:t>
+            </a:r>
+            <a:endParaRPr lang="en-US" sz="3200" b="1" dirty="0">
+              <a:solidFill>
+                <a:srgbClr val="FF4D4D"/>
+              </a:solidFill>
+              <a:latin typeface="Roboto"/>
+              <a:ea typeface="+mn-ea"/>
+              <a:cs typeface="+mn-cs"/>
+            </a:endParaRPr>
+          </a:p>
+        </p:txBody>
+      </p:sp>
+      <p:graphicFrame>
+        <p:nvGraphicFramePr>
+          <p:cNvPr id="2" name="Tablo 1">
+            <a:extLst>
+              <a:ext uri="{FF2B5EF4-FFF2-40B4-BE49-F238E27FC236}">
+                <a16:creationId xmlns:a16="http://schemas.microsoft.com/office/drawing/2014/main" id="{F7A6A035-4F9C-4E8A-9478-6E1DEF5AFA0B}"/>
+              </a:ext>
+            </a:extLst>
+          </p:cNvPr>
+          <p:cNvGraphicFramePr>
+            <a:graphicFrameLocks noGrp="1"/>
+          </p:cNvGraphicFramePr>
+          <p:nvPr>
+            <p:extLst>
+              <p:ext uri="{D42A27DB-BD31-4B8C-83A1-F6EECF244321}">
+                <p14:modId xmlns:p14="http://schemas.microsoft.com/office/powerpoint/2010/main" val="1627815027"/>
               </p:ext>
             </p:extLst>
           </p:nvPr>
@@ -7032,7 +8659,7 @@
                         <a:rPr lang="tr-TR" sz="1600" dirty="0">
                           <a:effectLst/>
                         </a:rPr>
-                        <a:t>Ubuntu, Python-Jupyter.</a:t>
+                        <a:t>Ubuntu veya Windows 10, Python-Jupyter.</a:t>
                       </a:r>
                       <a:endParaRPr lang="tr-TR" sz="1600" dirty="0">
                         <a:effectLst/>
@@ -7170,7 +8797,7 @@
 </p:sld>
 </file>
 
-<file path=ppt/slides/slide7.xml><?xml version="1.0" encoding="utf-8"?>
+<file path=ppt/slides/slide8.xml><?xml version="1.0" encoding="utf-8"?>
 <p:sld xmlns:a="http://schemas.openxmlformats.org/drawingml/2006/main" xmlns:r="http://schemas.openxmlformats.org/officeDocument/2006/relationships" xmlns:p="http://schemas.openxmlformats.org/presentationml/2006/main">
   <p:cSld>
     <p:spTree>

</xml_diff>